<commit_message>
Update Anvisys presentation & poster.pptx
</commit_message>
<xml_diff>
--- a/Anvisys presentation & poster.pptx
+++ b/Anvisys presentation & poster.pptx
@@ -124,7 +124,7 @@
   </p:defaultTextStyle>
   <p:extLst>
     <p:ext uri="{EFAFB233-063F-42B5-8137-9DF3F51BA10A}">
-      <p15:sldGuideLst xmlns:p15="http://schemas.microsoft.com/office/powerpoint/2012/main" xmlns="">
+      <p15:sldGuideLst xmlns:p15="http://schemas.microsoft.com/office/powerpoint/2012/main">
         <p15:guide id="1" orient="horz" pos="2160">
           <p15:clr>
             <a:srgbClr val="A4A3A4"/>
@@ -223,7 +223,7 @@
           <a:p>
             <a:fld id="{9836EA8E-4424-4A9A-BA95-A118E6208F28}" type="datetimeFigureOut">
               <a:rPr lang="en-IN" smtClean="0"/>
-              <a:t>03-07-2019</a:t>
+              <a:t>04-07-2019</a:t>
             </a:fld>
             <a:endParaRPr lang="en-IN"/>
           </a:p>
@@ -536,19 +536,19 @@
           <a:lstStyle/>
           <a:p>
             <a:r>
-              <a:rPr lang="en-IN" dirty="0" smtClean="0"/>
+              <a:rPr lang="en-IN" dirty="0"/>
               <a:t>Having</a:t>
             </a:r>
             <a:r>
-              <a:rPr lang="en-IN" baseline="0" dirty="0" smtClean="0"/>
+              <a:rPr lang="en-IN" baseline="0" dirty="0"/>
               <a:t> I.T related problems ..we provide all kind of I.T support. </a:t>
             </a:r>
             <a:r>
-              <a:rPr lang="en-IN" baseline="0" dirty="0" err="1" smtClean="0"/>
+              <a:rPr lang="en-IN" baseline="0" dirty="0" err="1"/>
               <a:t>Anvisys</a:t>
             </a:r>
             <a:r>
-              <a:rPr lang="en-IN" baseline="0" dirty="0" smtClean="0"/>
+              <a:rPr lang="en-IN" baseline="0" dirty="0"/>
               <a:t> Technology your Trusted IT solution and consulting partner </a:t>
             </a:r>
             <a:endParaRPr lang="en-IN" dirty="0"/>
@@ -635,11 +635,11 @@
           <a:bodyPr/>
           <a:lstStyle/>
           <a:p>
-            <a:endParaRPr lang="en-IN" dirty="0" smtClean="0"/>
+            <a:endParaRPr lang="en-IN" dirty="0"/>
           </a:p>
           <a:p>
             <a:r>
-              <a:rPr lang="en-IN" dirty="0" smtClean="0"/>
+              <a:rPr lang="en-IN" dirty="0"/>
               <a:t>What we do ? </a:t>
             </a:r>
           </a:p>
@@ -729,11 +729,11 @@
           <a:lstStyle/>
           <a:p>
             <a:r>
-              <a:rPr lang="en-IN" dirty="0" smtClean="0"/>
+              <a:rPr lang="en-IN" dirty="0"/>
               <a:t>We</a:t>
             </a:r>
             <a:r>
-              <a:rPr lang="en-IN" baseline="0" dirty="0" smtClean="0"/>
+              <a:rPr lang="en-IN" baseline="0" dirty="0"/>
               <a:t> provide IT support and services to  the most diverse clientele . From Health industry , Water resource industry and IT industry ..</a:t>
             </a:r>
             <a:endParaRPr lang="en-IN" dirty="0"/>
@@ -821,11 +821,11 @@
           <a:lstStyle/>
           <a:p>
             <a:r>
-              <a:rPr lang="en-IN" dirty="0" smtClean="0"/>
+              <a:rPr lang="en-IN" dirty="0"/>
               <a:t>Types</a:t>
             </a:r>
             <a:r>
-              <a:rPr lang="en-IN" baseline="0" dirty="0" smtClean="0"/>
+              <a:rPr lang="en-IN" baseline="0" dirty="0"/>
               <a:t> of services we offer </a:t>
             </a:r>
             <a:endParaRPr lang="en-IN" dirty="0"/>
@@ -913,21 +913,21 @@
           <a:lstStyle/>
           <a:p>
             <a:r>
-              <a:rPr lang="en-IN" baseline="0" dirty="0" err="1" smtClean="0"/>
+              <a:rPr lang="en-IN" baseline="0" dirty="0" err="1"/>
               <a:t>Anvisys</a:t>
             </a:r>
             <a:r>
-              <a:rPr lang="en-IN" baseline="0" dirty="0" smtClean="0"/>
+              <a:rPr lang="en-IN" baseline="0" dirty="0"/>
               <a:t> Technology </a:t>
             </a:r>
           </a:p>
           <a:p>
             <a:r>
-              <a:rPr lang="en-IN" baseline="0" dirty="0" smtClean="0"/>
+              <a:rPr lang="en-IN" baseline="0" dirty="0"/>
               <a:t>www.Anvisys.net  </a:t>
             </a:r>
             <a:r>
-              <a:rPr lang="en-IN" baseline="0" smtClean="0"/>
+              <a:rPr lang="en-IN" baseline="0"/>
               <a:t>contact us. </a:t>
             </a:r>
             <a:endParaRPr lang="en-IN" baseline="0" dirty="0"/>
@@ -1102,11 +1102,11 @@
           <a:lstStyle/>
           <a:p>
             <a:r>
-              <a:rPr lang="en-IN" dirty="0" smtClean="0"/>
+              <a:rPr lang="en-IN" dirty="0"/>
               <a:t>Services</a:t>
             </a:r>
             <a:r>
-              <a:rPr lang="en-IN" baseline="0" dirty="0" smtClean="0"/>
+              <a:rPr lang="en-IN" baseline="0" dirty="0"/>
               <a:t> we offer … visit www.anvisys.net today </a:t>
             </a:r>
             <a:endParaRPr lang="en-IN" dirty="0"/>
@@ -1278,11 +1278,11 @@
           <a:lstStyle/>
           <a:p>
             <a:r>
-              <a:rPr lang="en-IN" dirty="0" smtClean="0"/>
+              <a:rPr lang="en-IN" dirty="0"/>
               <a:t>In search</a:t>
             </a:r>
             <a:r>
-              <a:rPr lang="en-IN" baseline="0" dirty="0" smtClean="0"/>
+              <a:rPr lang="en-IN" baseline="0" dirty="0"/>
               <a:t> for an IT consultant..? With the correct IT partner reach your business goals </a:t>
             </a:r>
             <a:endParaRPr lang="en-IN" dirty="0"/>
@@ -1370,19 +1370,19 @@
           <a:lstStyle/>
           <a:p>
             <a:r>
-              <a:rPr lang="en-IN" dirty="0" smtClean="0"/>
+              <a:rPr lang="en-IN" dirty="0"/>
               <a:t>5 ways how</a:t>
             </a:r>
             <a:r>
-              <a:rPr lang="en-IN" baseline="0" dirty="0" smtClean="0"/>
+              <a:rPr lang="en-IN" baseline="0" dirty="0"/>
               <a:t> </a:t>
             </a:r>
             <a:r>
-              <a:rPr lang="en-IN" baseline="0" dirty="0" err="1" smtClean="0"/>
+              <a:rPr lang="en-IN" baseline="0" dirty="0" err="1"/>
               <a:t>Anvisys</a:t>
             </a:r>
             <a:r>
-              <a:rPr lang="en-IN" baseline="0" dirty="0" smtClean="0"/>
+              <a:rPr lang="en-IN" baseline="0" dirty="0"/>
               <a:t> can help you grow and provide a efficient IT support. </a:t>
             </a:r>
             <a:endParaRPr lang="en-IN" dirty="0"/>
@@ -1470,15 +1470,15 @@
           <a:lstStyle/>
           <a:p>
             <a:r>
-              <a:rPr lang="en-IN" dirty="0" err="1" smtClean="0"/>
+              <a:rPr lang="en-IN" dirty="0" err="1"/>
               <a:t>Anvisys</a:t>
             </a:r>
             <a:r>
-              <a:rPr lang="en-IN" dirty="0" smtClean="0"/>
+              <a:rPr lang="en-IN" dirty="0"/>
               <a:t> Technology</a:t>
             </a:r>
             <a:r>
-              <a:rPr lang="en-IN" baseline="0" dirty="0" smtClean="0"/>
+              <a:rPr lang="en-IN" baseline="0" dirty="0"/>
               <a:t> ..Our Area of Expertise </a:t>
             </a:r>
             <a:endParaRPr lang="en-IN" dirty="0"/>
@@ -1566,11 +1566,11 @@
           <a:lstStyle/>
           <a:p>
             <a:r>
-              <a:rPr lang="en-IN" dirty="0" err="1" smtClean="0"/>
+              <a:rPr lang="en-IN" dirty="0" err="1"/>
               <a:t>Anvisys</a:t>
             </a:r>
             <a:r>
-              <a:rPr lang="en-IN" baseline="0" dirty="0" smtClean="0"/>
+              <a:rPr lang="en-IN" baseline="0" dirty="0"/>
               <a:t> also carter different needs of the consumer demand with its unique and various products. We offer Location sharing app , Managing accounts &amp; society system for gated communities. </a:t>
             </a:r>
             <a:endParaRPr lang="en-IN" dirty="0"/>
@@ -1658,11 +1658,11 @@
           <a:lstStyle/>
           <a:p>
             <a:r>
-              <a:rPr lang="en-IN" dirty="0" smtClean="0"/>
+              <a:rPr lang="en-IN" dirty="0"/>
               <a:t>We</a:t>
             </a:r>
             <a:r>
-              <a:rPr lang="en-IN" baseline="0" dirty="0" smtClean="0"/>
+              <a:rPr lang="en-IN" baseline="0" dirty="0"/>
               <a:t> provide number of Software solution with our dedicated team members who are adamant to deliver the top notch services to our clients from various industries. </a:t>
             </a:r>
             <a:endParaRPr lang="en-IN" dirty="0"/>
@@ -1886,7 +1886,7 @@
           <a:p>
             <a:fld id="{D88684BC-97E8-4EB7-B548-A80FF2565271}" type="datetimeFigureOut">
               <a:rPr lang="en-IN" smtClean="0"/>
-              <a:t>03-07-2019</a:t>
+              <a:t>04-07-2019</a:t>
             </a:fld>
             <a:endParaRPr lang="en-IN"/>
           </a:p>
@@ -2056,7 +2056,7 @@
           <a:p>
             <a:fld id="{D88684BC-97E8-4EB7-B548-A80FF2565271}" type="datetimeFigureOut">
               <a:rPr lang="en-IN" smtClean="0"/>
-              <a:t>03-07-2019</a:t>
+              <a:t>04-07-2019</a:t>
             </a:fld>
             <a:endParaRPr lang="en-IN"/>
           </a:p>
@@ -2236,7 +2236,7 @@
           <a:p>
             <a:fld id="{D88684BC-97E8-4EB7-B548-A80FF2565271}" type="datetimeFigureOut">
               <a:rPr lang="en-IN" smtClean="0"/>
-              <a:t>03-07-2019</a:t>
+              <a:t>04-07-2019</a:t>
             </a:fld>
             <a:endParaRPr lang="en-IN"/>
           </a:p>
@@ -2695,7 +2695,7 @@
           </a:lstStyle>
           <a:p>
             <a:r>
-              <a:rPr lang="en-US" smtClean="0"/>
+              <a:rPr lang="en-US"/>
               <a:t>Click to edit Master subtitle style</a:t>
             </a:r>
             <a:endParaRPr lang="en-US" dirty="0"/>
@@ -2719,7 +2719,7 @@
           <a:p>
             <a:fld id="{D88684BC-97E8-4EB7-B548-A80FF2565271}" type="datetimeFigureOut">
               <a:rPr lang="en-IN" smtClean="0"/>
-              <a:t>03-07-2019</a:t>
+              <a:t>04-07-2019</a:t>
             </a:fld>
             <a:endParaRPr lang="en-IN"/>
           </a:p>
@@ -2795,7 +2795,7 @@
           </a:lstStyle>
           <a:p>
             <a:r>
-              <a:rPr lang="en-US" smtClean="0"/>
+              <a:rPr lang="en-US"/>
               <a:t>Click to edit Master title style</a:t>
             </a:r>
             <a:endParaRPr lang="en-US" dirty="0"/>
@@ -2807,13 +2807,6 @@
   <p:clrMapOvr>
     <a:masterClrMapping/>
   </p:clrMapOvr>
-  <p:timing>
-    <p:tnLst>
-      <p:par>
-        <p:cTn id="1" dur="indefinite" restart="never" nodeType="tmRoot"/>
-      </p:par>
-    </p:tnLst>
-  </p:timing>
 </p:sldLayout>
 </file>
 
@@ -2851,7 +2844,7 @@
           <a:p>
             <a:fld id="{D88684BC-97E8-4EB7-B548-A80FF2565271}" type="datetimeFigureOut">
               <a:rPr lang="en-IN" smtClean="0"/>
-              <a:t>03-07-2019</a:t>
+              <a:t>04-07-2019</a:t>
             </a:fld>
             <a:endParaRPr lang="en-IN"/>
           </a:p>
@@ -2915,10 +2908,9 @@
           <a:lstStyle/>
           <a:p>
             <a:r>
-              <a:rPr lang="en-US" smtClean="0"/>
+              <a:rPr lang="en-US"/>
               <a:t>Click to edit Master title style</a:t>
             </a:r>
-            <a:endParaRPr lang="en-US"/>
           </a:p>
         </p:txBody>
       </p:sp>
@@ -2944,35 +2936,35 @@
           <a:p>
             <a:pPr lvl="0"/>
             <a:r>
-              <a:rPr lang="en-US" smtClean="0"/>
+              <a:rPr lang="en-US"/>
               <a:t>Click to edit Master text styles</a:t>
             </a:r>
           </a:p>
           <a:p>
             <a:pPr lvl="1"/>
             <a:r>
-              <a:rPr lang="en-US" smtClean="0"/>
+              <a:rPr lang="en-US"/>
               <a:t>Second level</a:t>
             </a:r>
           </a:p>
           <a:p>
             <a:pPr lvl="2"/>
             <a:r>
-              <a:rPr lang="en-US" smtClean="0"/>
+              <a:rPr lang="en-US"/>
               <a:t>Third level</a:t>
             </a:r>
           </a:p>
           <a:p>
             <a:pPr lvl="3"/>
             <a:r>
-              <a:rPr lang="en-US" smtClean="0"/>
+              <a:rPr lang="en-US"/>
               <a:t>Fourth level</a:t>
             </a:r>
           </a:p>
           <a:p>
             <a:pPr lvl="4"/>
             <a:r>
-              <a:rPr lang="en-US" smtClean="0"/>
+              <a:rPr lang="en-US"/>
               <a:t>Fifth level</a:t>
             </a:r>
             <a:endParaRPr lang="en-US" dirty="0"/>
@@ -2984,13 +2976,6 @@
   <p:clrMapOvr>
     <a:masterClrMapping/>
   </p:clrMapOvr>
-  <p:timing>
-    <p:tnLst>
-      <p:par>
-        <p:cTn id="1" dur="indefinite" restart="never" nodeType="tmRoot"/>
-      </p:par>
-    </p:tnLst>
-  </p:timing>
 </p:sldLayout>
 </file>
 
@@ -3306,7 +3291,7 @@
           </a:lstStyle>
           <a:p>
             <a:r>
-              <a:rPr lang="en-US" smtClean="0"/>
+              <a:rPr lang="en-US"/>
               <a:t>Click to edit Master title style</a:t>
             </a:r>
             <a:endParaRPr lang="en-US" dirty="0"/>
@@ -3424,7 +3409,7 @@
           <a:p>
             <a:pPr lvl="0"/>
             <a:r>
-              <a:rPr lang="en-US" smtClean="0"/>
+              <a:rPr lang="en-US"/>
               <a:t>Click to edit Master text styles</a:t>
             </a:r>
           </a:p>
@@ -3447,7 +3432,7 @@
           <a:p>
             <a:fld id="{D88684BC-97E8-4EB7-B548-A80FF2565271}" type="datetimeFigureOut">
               <a:rPr lang="en-IN" smtClean="0"/>
-              <a:t>03-07-2019</a:t>
+              <a:t>04-07-2019</a:t>
             </a:fld>
             <a:endParaRPr lang="en-IN"/>
           </a:p>
@@ -3500,13 +3485,6 @@
   <p:clrMapOvr>
     <a:masterClrMapping/>
   </p:clrMapOvr>
-  <p:timing>
-    <p:tnLst>
-      <p:par>
-        <p:cTn id="1" dur="indefinite" restart="never" nodeType="tmRoot"/>
-      </p:par>
-    </p:tnLst>
-  </p:timing>
 </p:sldLayout>
 </file>
 
@@ -3544,7 +3522,7 @@
           <a:p>
             <a:fld id="{D88684BC-97E8-4EB7-B548-A80FF2565271}" type="datetimeFigureOut">
               <a:rPr lang="en-IN" smtClean="0"/>
-              <a:t>03-07-2019</a:t>
+              <a:t>04-07-2019</a:t>
             </a:fld>
             <a:endParaRPr lang="en-IN"/>
           </a:p>
@@ -3608,10 +3586,9 @@
           <a:lstStyle/>
           <a:p>
             <a:r>
-              <a:rPr lang="en-US" smtClean="0"/>
+              <a:rPr lang="en-US"/>
               <a:t>Click to edit Master title style</a:t>
             </a:r>
-            <a:endParaRPr lang="en-US"/>
           </a:p>
         </p:txBody>
       </p:sp>
@@ -3637,38 +3614,37 @@
           <a:p>
             <a:pPr lvl="0"/>
             <a:r>
-              <a:rPr lang="en-US" smtClean="0"/>
+              <a:rPr lang="en-US"/>
               <a:t>Click to edit Master text styles</a:t>
             </a:r>
           </a:p>
           <a:p>
             <a:pPr lvl="1"/>
             <a:r>
-              <a:rPr lang="en-US" smtClean="0"/>
+              <a:rPr lang="en-US"/>
               <a:t>Second level</a:t>
             </a:r>
           </a:p>
           <a:p>
             <a:pPr lvl="2"/>
             <a:r>
-              <a:rPr lang="en-US" smtClean="0"/>
+              <a:rPr lang="en-US"/>
               <a:t>Third level</a:t>
             </a:r>
           </a:p>
           <a:p>
             <a:pPr lvl="3"/>
             <a:r>
-              <a:rPr lang="en-US" smtClean="0"/>
+              <a:rPr lang="en-US"/>
               <a:t>Fourth level</a:t>
             </a:r>
           </a:p>
           <a:p>
             <a:pPr lvl="4"/>
             <a:r>
-              <a:rPr lang="en-US" smtClean="0"/>
+              <a:rPr lang="en-US"/>
               <a:t>Fifth level</a:t>
             </a:r>
-            <a:endParaRPr lang="en-US"/>
           </a:p>
         </p:txBody>
       </p:sp>
@@ -3694,38 +3670,37 @@
           <a:p>
             <a:pPr lvl="0"/>
             <a:r>
-              <a:rPr lang="en-US" smtClean="0"/>
+              <a:rPr lang="en-US"/>
               <a:t>Click to edit Master text styles</a:t>
             </a:r>
           </a:p>
           <a:p>
             <a:pPr lvl="1"/>
             <a:r>
-              <a:rPr lang="en-US" smtClean="0"/>
+              <a:rPr lang="en-US"/>
               <a:t>Second level</a:t>
             </a:r>
           </a:p>
           <a:p>
             <a:pPr lvl="2"/>
             <a:r>
-              <a:rPr lang="en-US" smtClean="0"/>
+              <a:rPr lang="en-US"/>
               <a:t>Third level</a:t>
             </a:r>
           </a:p>
           <a:p>
             <a:pPr lvl="3"/>
             <a:r>
-              <a:rPr lang="en-US" smtClean="0"/>
+              <a:rPr lang="en-US"/>
               <a:t>Fourth level</a:t>
             </a:r>
           </a:p>
           <a:p>
             <a:pPr lvl="4"/>
             <a:r>
-              <a:rPr lang="en-US" smtClean="0"/>
+              <a:rPr lang="en-US"/>
               <a:t>Fifth level</a:t>
             </a:r>
-            <a:endParaRPr lang="en-US"/>
           </a:p>
         </p:txBody>
       </p:sp>
@@ -3734,13 +3709,6 @@
   <p:clrMapOvr>
     <a:masterClrMapping/>
   </p:clrMapOvr>
-  <p:timing>
-    <p:tnLst>
-      <p:par>
-        <p:cTn id="1" dur="indefinite" restart="never" nodeType="tmRoot"/>
-      </p:par>
-    </p:tnLst>
-  </p:timing>
 </p:sldLayout>
 </file>
 
@@ -3846,7 +3814,7 @@
           <a:p>
             <a:pPr lvl="0"/>
             <a:r>
-              <a:rPr lang="en-US" smtClean="0"/>
+              <a:rPr lang="en-US"/>
               <a:t>Click to edit Master text styles</a:t>
             </a:r>
           </a:p>
@@ -3904,35 +3872,35 @@
           <a:p>
             <a:pPr lvl="0"/>
             <a:r>
-              <a:rPr lang="en-US" smtClean="0"/>
+              <a:rPr lang="en-US"/>
               <a:t>Click to edit Master text styles</a:t>
             </a:r>
           </a:p>
           <a:p>
             <a:pPr lvl="1"/>
             <a:r>
-              <a:rPr lang="en-US" smtClean="0"/>
+              <a:rPr lang="en-US"/>
               <a:t>Second level</a:t>
             </a:r>
           </a:p>
           <a:p>
             <a:pPr lvl="2"/>
             <a:r>
-              <a:rPr lang="en-US" smtClean="0"/>
+              <a:rPr lang="en-US"/>
               <a:t>Third level</a:t>
             </a:r>
           </a:p>
           <a:p>
             <a:pPr lvl="3"/>
             <a:r>
-              <a:rPr lang="en-US" smtClean="0"/>
+              <a:rPr lang="en-US"/>
               <a:t>Fourth level</a:t>
             </a:r>
           </a:p>
           <a:p>
             <a:pPr lvl="4"/>
             <a:r>
-              <a:rPr lang="en-US" smtClean="0"/>
+              <a:rPr lang="en-US"/>
               <a:t>Fifth level</a:t>
             </a:r>
             <a:endParaRPr lang="en-US" dirty="0"/>
@@ -4039,7 +4007,7 @@
               <a:buNone/>
             </a:pPr>
             <a:r>
-              <a:rPr lang="en-US" smtClean="0"/>
+              <a:rPr lang="en-US"/>
               <a:t>Click to edit Master text styles</a:t>
             </a:r>
           </a:p>
@@ -4097,35 +4065,35 @@
           <a:p>
             <a:pPr lvl="0"/>
             <a:r>
-              <a:rPr lang="en-US" smtClean="0"/>
+              <a:rPr lang="en-US"/>
               <a:t>Click to edit Master text styles</a:t>
             </a:r>
           </a:p>
           <a:p>
             <a:pPr lvl="1"/>
             <a:r>
-              <a:rPr lang="en-US" smtClean="0"/>
+              <a:rPr lang="en-US"/>
               <a:t>Second level</a:t>
             </a:r>
           </a:p>
           <a:p>
             <a:pPr lvl="2"/>
             <a:r>
-              <a:rPr lang="en-US" smtClean="0"/>
+              <a:rPr lang="en-US"/>
               <a:t>Third level</a:t>
             </a:r>
           </a:p>
           <a:p>
             <a:pPr lvl="3"/>
             <a:r>
-              <a:rPr lang="en-US" smtClean="0"/>
+              <a:rPr lang="en-US"/>
               <a:t>Fourth level</a:t>
             </a:r>
           </a:p>
           <a:p>
             <a:pPr lvl="4"/>
             <a:r>
-              <a:rPr lang="en-US" smtClean="0"/>
+              <a:rPr lang="en-US"/>
               <a:t>Fifth level</a:t>
             </a:r>
             <a:endParaRPr lang="en-US" dirty="0"/>
@@ -4149,7 +4117,7 @@
           <a:p>
             <a:fld id="{D88684BC-97E8-4EB7-B548-A80FF2565271}" type="datetimeFigureOut">
               <a:rPr lang="en-IN" smtClean="0"/>
-              <a:t>03-07-2019</a:t>
+              <a:t>04-07-2019</a:t>
             </a:fld>
             <a:endParaRPr lang="en-IN"/>
           </a:p>
@@ -4213,7 +4181,7 @@
           <a:lstStyle/>
           <a:p>
             <a:r>
-              <a:rPr lang="en-US" smtClean="0"/>
+              <a:rPr lang="en-US"/>
               <a:t>Click to edit Master title style</a:t>
             </a:r>
             <a:endParaRPr lang="en-US" dirty="0"/>
@@ -4225,13 +4193,6 @@
   <p:clrMapOvr>
     <a:masterClrMapping/>
   </p:clrMapOvr>
-  <p:timing>
-    <p:tnLst>
-      <p:par>
-        <p:cTn id="1" dur="indefinite" restart="never" nodeType="tmRoot"/>
-      </p:par>
-    </p:tnLst>
-  </p:timing>
 </p:sldLayout>
 </file>
 
@@ -4268,7 +4229,7 @@
           <a:lstStyle/>
           <a:p>
             <a:r>
-              <a:rPr lang="en-US" smtClean="0"/>
+              <a:rPr lang="en-US"/>
               <a:t>Click to edit Master title style</a:t>
             </a:r>
             <a:endParaRPr lang="en-US" dirty="0"/>
@@ -4292,7 +4253,7 @@
           <a:p>
             <a:fld id="{D88684BC-97E8-4EB7-B548-A80FF2565271}" type="datetimeFigureOut">
               <a:rPr lang="en-IN" smtClean="0"/>
-              <a:t>03-07-2019</a:t>
+              <a:t>04-07-2019</a:t>
             </a:fld>
             <a:endParaRPr lang="en-IN"/>
           </a:p>
@@ -4345,13 +4306,6 @@
   <p:clrMapOvr>
     <a:masterClrMapping/>
   </p:clrMapOvr>
-  <p:timing>
-    <p:tnLst>
-      <p:par>
-        <p:cTn id="1" dur="indefinite" restart="never" nodeType="tmRoot"/>
-      </p:par>
-    </p:tnLst>
-  </p:timing>
 </p:sldLayout>
 </file>
 
@@ -4389,7 +4343,7 @@
           <a:p>
             <a:fld id="{D88684BC-97E8-4EB7-B548-A80FF2565271}" type="datetimeFigureOut">
               <a:rPr lang="en-IN" smtClean="0"/>
-              <a:t>03-07-2019</a:t>
+              <a:t>04-07-2019</a:t>
             </a:fld>
             <a:endParaRPr lang="en-IN"/>
           </a:p>
@@ -4442,13 +4396,6 @@
   <p:clrMapOvr>
     <a:masterClrMapping/>
   </p:clrMapOvr>
-  <p:timing>
-    <p:tnLst>
-      <p:par>
-        <p:cTn id="1" dur="indefinite" restart="never" nodeType="tmRoot"/>
-      </p:par>
-    </p:tnLst>
-  </p:timing>
 </p:sldLayout>
 </file>
 
@@ -4499,7 +4446,7 @@
           </a:lstStyle>
           <a:p>
             <a:r>
-              <a:rPr lang="en-US" smtClean="0"/>
+              <a:rPr lang="en-US"/>
               <a:t>Click to edit Master title style</a:t>
             </a:r>
             <a:endParaRPr lang="en-US" dirty="0"/>
@@ -4556,35 +4503,35 @@
           <a:p>
             <a:pPr lvl="0"/>
             <a:r>
-              <a:rPr lang="en-US" smtClean="0"/>
+              <a:rPr lang="en-US"/>
               <a:t>Click to edit Master text styles</a:t>
             </a:r>
           </a:p>
           <a:p>
             <a:pPr lvl="1"/>
             <a:r>
-              <a:rPr lang="en-US" smtClean="0"/>
+              <a:rPr lang="en-US"/>
               <a:t>Second level</a:t>
             </a:r>
           </a:p>
           <a:p>
             <a:pPr lvl="2"/>
             <a:r>
-              <a:rPr lang="en-US" smtClean="0"/>
+              <a:rPr lang="en-US"/>
               <a:t>Third level</a:t>
             </a:r>
           </a:p>
           <a:p>
             <a:pPr lvl="3"/>
             <a:r>
-              <a:rPr lang="en-US" smtClean="0"/>
+              <a:rPr lang="en-US"/>
               <a:t>Fourth level</a:t>
             </a:r>
           </a:p>
           <a:p>
             <a:pPr lvl="4"/>
             <a:r>
-              <a:rPr lang="en-US" smtClean="0"/>
+              <a:rPr lang="en-US"/>
               <a:t>Fifth level</a:t>
             </a:r>
             <a:endParaRPr lang="en-US" dirty="0"/>
@@ -4650,7 +4597,7 @@
           <a:p>
             <a:pPr lvl="0"/>
             <a:r>
-              <a:rPr lang="en-US" smtClean="0"/>
+              <a:rPr lang="en-US"/>
               <a:t>Click to edit Master text styles</a:t>
             </a:r>
           </a:p>
@@ -4673,7 +4620,7 @@
           <a:p>
             <a:fld id="{D88684BC-97E8-4EB7-B548-A80FF2565271}" type="datetimeFigureOut">
               <a:rPr lang="en-IN" smtClean="0"/>
-              <a:t>03-07-2019</a:t>
+              <a:t>04-07-2019</a:t>
             </a:fld>
             <a:endParaRPr lang="en-IN"/>
           </a:p>
@@ -4726,13 +4673,6 @@
   <p:clrMapOvr>
     <a:masterClrMapping/>
   </p:clrMapOvr>
-  <p:timing>
-    <p:tnLst>
-      <p:par>
-        <p:cTn id="1" dur="indefinite" restart="never" nodeType="tmRoot"/>
-      </p:par>
-    </p:tnLst>
-  </p:timing>
 </p:sldLayout>
 </file>
 
@@ -4845,7 +4785,7 @@
           <a:p>
             <a:fld id="{D88684BC-97E8-4EB7-B548-A80FF2565271}" type="datetimeFigureOut">
               <a:rPr lang="en-IN" smtClean="0"/>
-              <a:t>03-07-2019</a:t>
+              <a:t>04-07-2019</a:t>
             </a:fld>
             <a:endParaRPr lang="en-IN"/>
           </a:p>
@@ -5275,7 +5215,7 @@
           </a:lstStyle>
           <a:p>
             <a:r>
-              <a:rPr lang="en-US" smtClean="0"/>
+              <a:rPr lang="en-US"/>
               <a:t>Click icon to add picture</a:t>
             </a:r>
             <a:endParaRPr lang="en-US" dirty="0"/>
@@ -5342,7 +5282,7 @@
           <a:p>
             <a:pPr lvl="0"/>
             <a:r>
-              <a:rPr lang="en-US" smtClean="0"/>
+              <a:rPr lang="en-US"/>
               <a:t>Click to edit Master text styles</a:t>
             </a:r>
           </a:p>
@@ -5365,7 +5305,7 @@
           <a:p>
             <a:fld id="{D88684BC-97E8-4EB7-B548-A80FF2565271}" type="datetimeFigureOut">
               <a:rPr lang="en-IN" smtClean="0"/>
-              <a:t>03-07-2019</a:t>
+              <a:t>04-07-2019</a:t>
             </a:fld>
             <a:endParaRPr lang="en-IN"/>
           </a:p>
@@ -5440,7 +5380,7 @@
           </a:lstStyle>
           <a:p>
             <a:r>
-              <a:rPr lang="en-US" smtClean="0"/>
+              <a:rPr lang="en-US"/>
               <a:t>Click to edit Master title style</a:t>
             </a:r>
             <a:endParaRPr lang="en-US" dirty="0"/>
@@ -5452,13 +5392,6 @@
   <p:clrMapOvr>
     <a:masterClrMapping/>
   </p:clrMapOvr>
-  <p:timing>
-    <p:tnLst>
-      <p:par>
-        <p:cTn id="1" dur="indefinite" restart="never" nodeType="tmRoot"/>
-      </p:par>
-    </p:tnLst>
-  </p:timing>
 </p:sldLayout>
 </file>
 
@@ -5495,10 +5428,9 @@
           <a:lstStyle/>
           <a:p>
             <a:r>
-              <a:rPr lang="en-US" smtClean="0"/>
+              <a:rPr lang="en-US"/>
               <a:t>Click to edit Master title style</a:t>
             </a:r>
-            <a:endParaRPr lang="en-US"/>
           </a:p>
         </p:txBody>
       </p:sp>
@@ -5524,38 +5456,37 @@
           <a:p>
             <a:pPr lvl="0"/>
             <a:r>
-              <a:rPr lang="en-US" smtClean="0"/>
+              <a:rPr lang="en-US"/>
               <a:t>Click to edit Master text styles</a:t>
             </a:r>
           </a:p>
           <a:p>
             <a:pPr lvl="1"/>
             <a:r>
-              <a:rPr lang="en-US" smtClean="0"/>
+              <a:rPr lang="en-US"/>
               <a:t>Second level</a:t>
             </a:r>
           </a:p>
           <a:p>
             <a:pPr lvl="2"/>
             <a:r>
-              <a:rPr lang="en-US" smtClean="0"/>
+              <a:rPr lang="en-US"/>
               <a:t>Third level</a:t>
             </a:r>
           </a:p>
           <a:p>
             <a:pPr lvl="3"/>
             <a:r>
-              <a:rPr lang="en-US" smtClean="0"/>
+              <a:rPr lang="en-US"/>
               <a:t>Fourth level</a:t>
             </a:r>
           </a:p>
           <a:p>
             <a:pPr lvl="4"/>
             <a:r>
-              <a:rPr lang="en-US" smtClean="0"/>
+              <a:rPr lang="en-US"/>
               <a:t>Fifth level</a:t>
             </a:r>
-            <a:endParaRPr lang="en-US"/>
           </a:p>
         </p:txBody>
       </p:sp>
@@ -5576,7 +5507,7 @@
           <a:p>
             <a:fld id="{D88684BC-97E8-4EB7-B548-A80FF2565271}" type="datetimeFigureOut">
               <a:rPr lang="en-IN" smtClean="0"/>
-              <a:t>03-07-2019</a:t>
+              <a:t>04-07-2019</a:t>
             </a:fld>
             <a:endParaRPr lang="en-IN"/>
           </a:p>
@@ -5629,13 +5560,6 @@
   <p:clrMapOvr>
     <a:masterClrMapping/>
   </p:clrMapOvr>
-  <p:timing>
-    <p:tnLst>
-      <p:par>
-        <p:cTn id="1" dur="indefinite" restart="never" nodeType="tmRoot"/>
-      </p:par>
-    </p:tnLst>
-  </p:timing>
 </p:sldLayout>
 </file>
 
@@ -5682,10 +5606,9 @@
           </a:lstStyle>
           <a:p>
             <a:r>
-              <a:rPr lang="en-US" smtClean="0"/>
+              <a:rPr lang="en-US"/>
               <a:t>Click to edit Master title style</a:t>
             </a:r>
-            <a:endParaRPr lang="en-US"/>
           </a:p>
         </p:txBody>
       </p:sp>
@@ -5711,35 +5634,35 @@
           <a:p>
             <a:pPr lvl="0"/>
             <a:r>
-              <a:rPr lang="en-US" smtClean="0"/>
+              <a:rPr lang="en-US"/>
               <a:t>Click to edit Master text styles</a:t>
             </a:r>
           </a:p>
           <a:p>
             <a:pPr lvl="1"/>
             <a:r>
-              <a:rPr lang="en-US" smtClean="0"/>
+              <a:rPr lang="en-US"/>
               <a:t>Second level</a:t>
             </a:r>
           </a:p>
           <a:p>
             <a:pPr lvl="2"/>
             <a:r>
-              <a:rPr lang="en-US" smtClean="0"/>
+              <a:rPr lang="en-US"/>
               <a:t>Third level</a:t>
             </a:r>
           </a:p>
           <a:p>
             <a:pPr lvl="3"/>
             <a:r>
-              <a:rPr lang="en-US" smtClean="0"/>
+              <a:rPr lang="en-US"/>
               <a:t>Fourth level</a:t>
             </a:r>
           </a:p>
           <a:p>
             <a:pPr lvl="4"/>
             <a:r>
-              <a:rPr lang="en-US" smtClean="0"/>
+              <a:rPr lang="en-US"/>
               <a:t>Fifth level</a:t>
             </a:r>
             <a:endParaRPr lang="en-US" dirty="0"/>
@@ -5763,7 +5686,7 @@
           <a:p>
             <a:fld id="{D88684BC-97E8-4EB7-B548-A80FF2565271}" type="datetimeFigureOut">
               <a:rPr lang="en-IN" smtClean="0"/>
-              <a:t>03-07-2019</a:t>
+              <a:t>04-07-2019</a:t>
             </a:fld>
             <a:endParaRPr lang="en-IN"/>
           </a:p>
@@ -5816,13 +5739,6 @@
   <p:clrMapOvr>
     <a:masterClrMapping/>
   </p:clrMapOvr>
-  <p:timing>
-    <p:tnLst>
-      <p:par>
-        <p:cTn id="1" dur="indefinite" restart="never" nodeType="tmRoot"/>
-      </p:par>
-    </p:tnLst>
-  </p:timing>
 </p:sldLayout>
 </file>
 
@@ -6011,7 +5927,7 @@
           <a:p>
             <a:fld id="{D88684BC-97E8-4EB7-B548-A80FF2565271}" type="datetimeFigureOut">
               <a:rPr lang="en-IN" smtClean="0"/>
-              <a:t>03-07-2019</a:t>
+              <a:t>04-07-2019</a:t>
             </a:fld>
             <a:endParaRPr lang="en-IN"/>
           </a:p>
@@ -6299,7 +6215,7 @@
           <a:p>
             <a:fld id="{D88684BC-97E8-4EB7-B548-A80FF2565271}" type="datetimeFigureOut">
               <a:rPr lang="en-IN" smtClean="0"/>
-              <a:t>03-07-2019</a:t>
+              <a:t>04-07-2019</a:t>
             </a:fld>
             <a:endParaRPr lang="en-IN"/>
           </a:p>
@@ -6721,7 +6637,7 @@
           <a:p>
             <a:fld id="{D88684BC-97E8-4EB7-B548-A80FF2565271}" type="datetimeFigureOut">
               <a:rPr lang="en-IN" smtClean="0"/>
-              <a:t>03-07-2019</a:t>
+              <a:t>04-07-2019</a:t>
             </a:fld>
             <a:endParaRPr lang="en-IN"/>
           </a:p>
@@ -6839,7 +6755,7 @@
           <a:p>
             <a:fld id="{D88684BC-97E8-4EB7-B548-A80FF2565271}" type="datetimeFigureOut">
               <a:rPr lang="en-IN" smtClean="0"/>
-              <a:t>03-07-2019</a:t>
+              <a:t>04-07-2019</a:t>
             </a:fld>
             <a:endParaRPr lang="en-IN"/>
           </a:p>
@@ -6934,7 +6850,7 @@
           <a:p>
             <a:fld id="{D88684BC-97E8-4EB7-B548-A80FF2565271}" type="datetimeFigureOut">
               <a:rPr lang="en-IN" smtClean="0"/>
-              <a:t>03-07-2019</a:t>
+              <a:t>04-07-2019</a:t>
             </a:fld>
             <a:endParaRPr lang="en-IN"/>
           </a:p>
@@ -7211,7 +7127,7 @@
           <a:p>
             <a:fld id="{D88684BC-97E8-4EB7-B548-A80FF2565271}" type="datetimeFigureOut">
               <a:rPr lang="en-IN" smtClean="0"/>
-              <a:t>03-07-2019</a:t>
+              <a:t>04-07-2019</a:t>
             </a:fld>
             <a:endParaRPr lang="en-IN"/>
           </a:p>
@@ -7464,7 +7380,7 @@
           <a:p>
             <a:fld id="{D88684BC-97E8-4EB7-B548-A80FF2565271}" type="datetimeFigureOut">
               <a:rPr lang="en-IN" smtClean="0"/>
-              <a:t>03-07-2019</a:t>
+              <a:t>04-07-2019</a:t>
             </a:fld>
             <a:endParaRPr lang="en-IN"/>
           </a:p>
@@ -7677,7 +7593,7 @@
           <a:p>
             <a:fld id="{D88684BC-97E8-4EB7-B548-A80FF2565271}" type="datetimeFigureOut">
               <a:rPr lang="en-IN" smtClean="0"/>
-              <a:t>03-07-2019</a:t>
+              <a:t>04-07-2019</a:t>
             </a:fld>
             <a:endParaRPr lang="en-IN"/>
           </a:p>
@@ -8353,7 +8269,7 @@
           <a:lstStyle/>
           <a:p>
             <a:r>
-              <a:rPr lang="en-US" smtClean="0"/>
+              <a:rPr lang="en-US"/>
               <a:t>Click to edit Master title style</a:t>
             </a:r>
             <a:endParaRPr lang="en-US" dirty="0"/>
@@ -8387,35 +8303,35 @@
           <a:p>
             <a:pPr lvl="0"/>
             <a:r>
-              <a:rPr lang="en-US" smtClean="0"/>
+              <a:rPr lang="en-US"/>
               <a:t>Click to edit Master text styles</a:t>
             </a:r>
           </a:p>
           <a:p>
             <a:pPr lvl="1"/>
             <a:r>
-              <a:rPr lang="en-US" smtClean="0"/>
+              <a:rPr lang="en-US"/>
               <a:t>Second level</a:t>
             </a:r>
           </a:p>
           <a:p>
             <a:pPr lvl="2"/>
             <a:r>
-              <a:rPr lang="en-US" smtClean="0"/>
+              <a:rPr lang="en-US"/>
               <a:t>Third level</a:t>
             </a:r>
           </a:p>
           <a:p>
             <a:pPr lvl="3"/>
             <a:r>
-              <a:rPr lang="en-US" smtClean="0"/>
+              <a:rPr lang="en-US"/>
               <a:t>Fourth level</a:t>
             </a:r>
           </a:p>
           <a:p>
             <a:pPr lvl="4"/>
             <a:r>
-              <a:rPr lang="en-US" smtClean="0"/>
+              <a:rPr lang="en-US"/>
               <a:t>Fifth level</a:t>
             </a:r>
             <a:endParaRPr lang="en-US" dirty="0"/>
@@ -8458,7 +8374,7 @@
           <a:p>
             <a:fld id="{D88684BC-97E8-4EB7-B548-A80FF2565271}" type="datetimeFigureOut">
               <a:rPr lang="en-IN" smtClean="0"/>
-              <a:t>03-07-2019</a:t>
+              <a:t>04-07-2019</a:t>
             </a:fld>
             <a:endParaRPr lang="en-IN"/>
           </a:p>
@@ -8560,13 +8476,6 @@
     <p:sldLayoutId id="2147483670" r:id="rId10"/>
     <p:sldLayoutId id="2147483671" r:id="rId11"/>
   </p:sldLayoutIdLst>
-  <p:timing>
-    <p:tnLst>
-      <p:par>
-        <p:cTn id="1" dur="indefinite" restart="never" nodeType="tmRoot"/>
-      </p:par>
-    </p:tnLst>
-  </p:timing>
   <p:txStyles>
     <p:titleStyle>
       <a:lvl1pPr marL="320040" indent="-320040" algn="r" defTabSz="914400" rtl="0" eaLnBrk="1" latinLnBrk="0" hangingPunct="1">
@@ -11667,7 +11576,7 @@
             <p:cNvPr id="46" name="Picture 45">
               <a:extLst>
                 <a:ext uri="{FF2B5EF4-FFF2-40B4-BE49-F238E27FC236}">
-                  <a16:creationId xmlns:a16="http://schemas.microsoft.com/office/drawing/2014/main" xmlns="" id="{13C97FC4-4358-46A7-89E4-BB08F494C22B}"/>
+                  <a16:creationId xmlns:a16="http://schemas.microsoft.com/office/drawing/2014/main" id="{13C97FC4-4358-46A7-89E4-BB08F494C22B}"/>
                 </a:ext>
               </a:extLst>
             </p:cNvPr>
@@ -21105,8 +21014,8 @@
         </p:nvSpPr>
         <p:spPr>
           <a:xfrm>
-            <a:off x="2389152" y="2553823"/>
-            <a:ext cx="3158736" cy="1231106"/>
+            <a:off x="2292686" y="2160298"/>
+            <a:ext cx="3158736" cy="1323439"/>
           </a:xfrm>
           <a:prstGeom prst="rect">
             <a:avLst/>
@@ -21119,9 +21028,12 @@
           </a:bodyPr>
           <a:lstStyle/>
           <a:p>
-            <a:pPr lvl="0"/>
+            <a:pPr lvl="0" algn="ctr"/>
             <a:r>
-              <a:rPr lang="en-IN" sz="1600" dirty="0">
+              <a:rPr lang="en-IN" sz="2000" b="1" dirty="0">
+                <a:solidFill>
+                  <a:srgbClr val="FFFF00"/>
+                </a:solidFill>
                 <a:latin typeface="Times New Roman" pitchFamily="18" charset="0"/>
                 <a:cs typeface="Times New Roman" pitchFamily="18" charset="0"/>
               </a:rPr>
@@ -21129,20 +21041,17 @@
             </a:r>
           </a:p>
           <a:p>
-            <a:pPr lvl="0"/>
+            <a:pPr lvl="0" algn="ctr"/>
             <a:r>
-              <a:rPr lang="en-IN" sz="1600" dirty="0">
+              <a:rPr lang="en-IN" sz="2000" b="1" dirty="0">
+                <a:solidFill>
+                  <a:srgbClr val="FFFF00"/>
+                </a:solidFill>
                 <a:latin typeface="Times New Roman" pitchFamily="18" charset="0"/>
                 <a:cs typeface="Times New Roman" pitchFamily="18" charset="0"/>
               </a:rPr>
               <a:t>Android , Desktop, Web, DB</a:t>
             </a:r>
-          </a:p>
-          <a:p>
-            <a:endParaRPr lang="en-IN" sz="2400" dirty="0"/>
-          </a:p>
-          <a:p>
-            <a:endParaRPr lang="en-IN" dirty="0"/>
           </a:p>
         </p:txBody>
       </p:sp>
@@ -21154,8 +21063,8 @@
         </p:nvSpPr>
         <p:spPr>
           <a:xfrm>
-            <a:off x="6210568" y="2390065"/>
-            <a:ext cx="2567391" cy="861774"/>
+            <a:off x="5758051" y="2249199"/>
+            <a:ext cx="3077517" cy="1077218"/>
           </a:xfrm>
           <a:prstGeom prst="rect">
             <a:avLst/>
@@ -21168,17 +21077,38 @@
           </a:bodyPr>
           <a:lstStyle/>
           <a:p>
-            <a:pPr lvl="0"/>
+            <a:pPr lvl="0" algn="ctr"/>
             <a:r>
-              <a:rPr lang="en-IN" sz="1600" dirty="0">
+              <a:rPr lang="en-IN" sz="2000" b="1" dirty="0">
+                <a:solidFill>
+                  <a:srgbClr val="FFFF00"/>
+                </a:solidFill>
                 <a:latin typeface="Times New Roman" pitchFamily="18" charset="0"/>
                 <a:cs typeface="Times New Roman" pitchFamily="18" charset="0"/>
               </a:rPr>
-              <a:t>Staffing – Software Professionals</a:t>
+              <a:t>Staffing </a:t>
             </a:r>
           </a:p>
           <a:p>
-            <a:endParaRPr lang="en-IN" dirty="0"/>
+            <a:pPr lvl="0" algn="ctr"/>
+            <a:r>
+              <a:rPr lang="en-IN" sz="2000" b="1" dirty="0">
+                <a:solidFill>
+                  <a:srgbClr val="FFFF00"/>
+                </a:solidFill>
+                <a:latin typeface="Times New Roman" pitchFamily="18" charset="0"/>
+                <a:cs typeface="Times New Roman" pitchFamily="18" charset="0"/>
+              </a:rPr>
+              <a:t>Software Professionals</a:t>
+            </a:r>
+          </a:p>
+          <a:p>
+            <a:pPr algn="ctr"/>
+            <a:endParaRPr lang="en-IN" sz="2400" b="1" dirty="0">
+              <a:solidFill>
+                <a:srgbClr val="FFFF00"/>
+              </a:solidFill>
+            </a:endParaRPr>
           </a:p>
         </p:txBody>
       </p:sp>
@@ -21190,8 +21120,8 @@
         </p:nvSpPr>
         <p:spPr>
           <a:xfrm>
-            <a:off x="2717375" y="4808379"/>
-            <a:ext cx="3505196" cy="615553"/>
+            <a:off x="2728370" y="4713495"/>
+            <a:ext cx="2003093" cy="400110"/>
           </a:xfrm>
           <a:prstGeom prst="rect">
             <a:avLst/>
@@ -21202,20 +21132,25 @@
           <a:bodyPr wrap="square" rtlCol="0">
             <a:spAutoFit/>
           </a:bodyPr>
-          <a:lstStyle/>
-          <a:p>
-            <a:pPr lvl="0"/>
-            <a:r>
-              <a:rPr lang="en-IN" sz="1600" dirty="0">
+          <a:lstStyle>
+            <a:defPPr>
+              <a:defRPr lang="en-US"/>
+            </a:defPPr>
+            <a:lvl1pPr lvl="0" algn="ctr">
+              <a:defRPr sz="2000" b="1">
+                <a:solidFill>
+                  <a:srgbClr val="FFFF00"/>
+                </a:solidFill>
                 <a:latin typeface="Times New Roman" pitchFamily="18" charset="0"/>
                 <a:cs typeface="Times New Roman" pitchFamily="18" charset="0"/>
-              </a:rPr>
+              </a:defRPr>
+            </a:lvl1pPr>
+          </a:lstStyle>
+          <a:p>
+            <a:r>
+              <a:rPr lang="en-IN" dirty="0"/>
               <a:t>Software Testing</a:t>
             </a:r>
-            <a:endParaRPr lang="en-IN" sz="2000" dirty="0"/>
-          </a:p>
-          <a:p>
-            <a:endParaRPr lang="en-IN" dirty="0"/>
           </a:p>
         </p:txBody>
       </p:sp>
@@ -21227,8 +21162,8 @@
         </p:nvSpPr>
         <p:spPr>
           <a:xfrm>
-            <a:off x="5948393" y="4666219"/>
-            <a:ext cx="2641100" cy="584775"/>
+            <a:off x="6002977" y="4317427"/>
+            <a:ext cx="3217837" cy="1015663"/>
           </a:xfrm>
           <a:prstGeom prst="rect">
             <a:avLst/>
@@ -21239,16 +21174,41 @@
           <a:bodyPr wrap="square" rtlCol="0">
             <a:spAutoFit/>
           </a:bodyPr>
-          <a:lstStyle/>
-          <a:p>
-            <a:r>
-              <a:rPr lang="en-IN" sz="1600" dirty="0">
+          <a:lstStyle>
+            <a:defPPr>
+              <a:defRPr lang="en-US"/>
+            </a:defPPr>
+            <a:lvl1pPr lvl="0">
+              <a:defRPr sz="2000">
+                <a:solidFill>
+                  <a:srgbClr val="FD3F03"/>
+                </a:solidFill>
                 <a:latin typeface="Times New Roman" pitchFamily="18" charset="0"/>
                 <a:cs typeface="Times New Roman" pitchFamily="18" charset="0"/>
+              </a:defRPr>
+            </a:lvl1pPr>
+          </a:lstStyle>
+          <a:p>
+            <a:pPr algn="ctr"/>
+            <a:r>
+              <a:rPr lang="en-IN" b="1" dirty="0">
+                <a:solidFill>
+                  <a:srgbClr val="FFFF00"/>
+                </a:solidFill>
               </a:rPr>
-              <a:t>Geographical Information System(GIS</a:t>
+              <a:t>GIS Consultant</a:t>
             </a:r>
-            <a:endParaRPr lang="en-IN" sz="1600" dirty="0"/>
+          </a:p>
+          <a:p>
+            <a:pPr algn="ctr"/>
+            <a:r>
+              <a:rPr lang="en-IN" b="1" dirty="0">
+                <a:solidFill>
+                  <a:srgbClr val="FFFF00"/>
+                </a:solidFill>
+              </a:rPr>
+              <a:t>Geographical Information System</a:t>
+            </a:r>
           </a:p>
         </p:txBody>
       </p:sp>
@@ -21291,8 +21251,8 @@
         </p:nvSpPr>
         <p:spPr>
           <a:xfrm>
-            <a:off x="2871970" y="6063572"/>
-            <a:ext cx="3267241" cy="369332"/>
+            <a:off x="3265324" y="5839434"/>
+            <a:ext cx="4693272" cy="584775"/>
           </a:xfrm>
           <a:prstGeom prst="rect">
             <a:avLst/>
@@ -21305,34 +21265,34 @@
           <a:lstStyle/>
           <a:p>
             <a:r>
-              <a:rPr lang="en-IN" dirty="0" err="1">
+              <a:rPr lang="en-IN" sz="3200" dirty="0" err="1">
                 <a:latin typeface="AR DESTINE" pitchFamily="2" charset="0"/>
                 <a:cs typeface="Times New Roman" pitchFamily="18" charset="0"/>
               </a:rPr>
               <a:t>Anvisys</a:t>
             </a:r>
             <a:r>
-              <a:rPr lang="en-IN" dirty="0">
+              <a:rPr lang="en-IN" sz="3200" dirty="0">
                 <a:latin typeface="AR DESTINE" pitchFamily="2" charset="0"/>
                 <a:cs typeface="Times New Roman" pitchFamily="18" charset="0"/>
               </a:rPr>
               <a:t> technology </a:t>
             </a:r>
             <a:r>
-              <a:rPr lang="en-IN" dirty="0" err="1">
+              <a:rPr lang="en-IN" sz="3200" dirty="0" err="1">
                 <a:latin typeface="AR DESTINE" pitchFamily="2" charset="0"/>
                 <a:cs typeface="Times New Roman" pitchFamily="18" charset="0"/>
               </a:rPr>
               <a:t>Pvt.</a:t>
             </a:r>
             <a:r>
-              <a:rPr lang="en-IN" dirty="0">
+              <a:rPr lang="en-IN" sz="3200" dirty="0">
                 <a:latin typeface="AR DESTINE" pitchFamily="2" charset="0"/>
                 <a:cs typeface="Times New Roman" pitchFamily="18" charset="0"/>
               </a:rPr>
               <a:t> Ltd</a:t>
             </a:r>
-            <a:endParaRPr lang="en-IN" dirty="0"/>
+            <a:endParaRPr lang="en-IN" sz="3200" dirty="0"/>
           </a:p>
         </p:txBody>
       </p:sp>
@@ -21391,6 +21351,186 @@
           </a:p>
         </p:txBody>
       </p:sp>
+      <p:pic>
+        <p:nvPicPr>
+          <p:cNvPr id="17" name="Picture 16">
+            <a:extLst>
+              <a:ext uri="{FF2B5EF4-FFF2-40B4-BE49-F238E27FC236}">
+                <a16:creationId xmlns:a16="http://schemas.microsoft.com/office/drawing/2014/main" id="{68A8BBBB-1557-425D-ACDD-4A6E4C1461D8}"/>
+              </a:ext>
+            </a:extLst>
+          </p:cNvPr>
+          <p:cNvPicPr>
+            <a:picLocks noChangeAspect="1"/>
+          </p:cNvPicPr>
+          <p:nvPr/>
+        </p:nvPicPr>
+        <p:blipFill>
+          <a:blip r:embed="rId4" cstate="print">
+            <a:extLst>
+              <a:ext uri="{28A0092B-C50C-407E-A947-70E740481C1C}">
+                <a14:useLocalDpi xmlns:a14="http://schemas.microsoft.com/office/drawing/2010/main" val="0"/>
+              </a:ext>
+            </a:extLst>
+          </a:blip>
+          <a:stretch>
+            <a:fillRect/>
+          </a:stretch>
+        </p:blipFill>
+        <p:spPr>
+          <a:xfrm>
+            <a:off x="2441324" y="1276114"/>
+            <a:ext cx="782553" cy="626042"/>
+          </a:xfrm>
+          <a:prstGeom prst="rect">
+            <a:avLst/>
+          </a:prstGeom>
+        </p:spPr>
+      </p:pic>
+      <p:pic>
+        <p:nvPicPr>
+          <p:cNvPr id="30" name="Picture 29">
+            <a:extLst>
+              <a:ext uri="{FF2B5EF4-FFF2-40B4-BE49-F238E27FC236}">
+                <a16:creationId xmlns:a16="http://schemas.microsoft.com/office/drawing/2014/main" id="{1082384B-9F3E-4465-90F3-C061BA653D10}"/>
+              </a:ext>
+            </a:extLst>
+          </p:cNvPr>
+          <p:cNvPicPr>
+            <a:picLocks noChangeAspect="1"/>
+          </p:cNvPicPr>
+          <p:nvPr/>
+        </p:nvPicPr>
+        <p:blipFill>
+          <a:blip r:embed="rId5" cstate="print">
+            <a:extLst>
+              <a:ext uri="{28A0092B-C50C-407E-A947-70E740481C1C}">
+                <a14:useLocalDpi xmlns:a14="http://schemas.microsoft.com/office/drawing/2010/main" val="0"/>
+              </a:ext>
+            </a:extLst>
+          </a:blip>
+          <a:stretch>
+            <a:fillRect/>
+          </a:stretch>
+        </p:blipFill>
+        <p:spPr>
+          <a:xfrm>
+            <a:off x="3596399" y="1330588"/>
+            <a:ext cx="551310" cy="551310"/>
+          </a:xfrm>
+          <a:prstGeom prst="rect">
+            <a:avLst/>
+          </a:prstGeom>
+        </p:spPr>
+      </p:pic>
+      <p:pic>
+        <p:nvPicPr>
+          <p:cNvPr id="36" name="Picture 35">
+            <a:extLst>
+              <a:ext uri="{FF2B5EF4-FFF2-40B4-BE49-F238E27FC236}">
+                <a16:creationId xmlns:a16="http://schemas.microsoft.com/office/drawing/2014/main" id="{0A7DED1D-C953-4D8C-B876-1C90690B33B5}"/>
+              </a:ext>
+            </a:extLst>
+          </p:cNvPr>
+          <p:cNvPicPr>
+            <a:picLocks noChangeAspect="1"/>
+          </p:cNvPicPr>
+          <p:nvPr/>
+        </p:nvPicPr>
+        <p:blipFill>
+          <a:blip r:embed="rId6" cstate="print">
+            <a:extLst>
+              <a:ext uri="{28A0092B-C50C-407E-A947-70E740481C1C}">
+                <a14:useLocalDpi xmlns:a14="http://schemas.microsoft.com/office/drawing/2010/main" val="0"/>
+              </a:ext>
+            </a:extLst>
+          </a:blip>
+          <a:stretch>
+            <a:fillRect/>
+          </a:stretch>
+        </p:blipFill>
+        <p:spPr>
+          <a:xfrm>
+            <a:off x="415429" y="1419167"/>
+            <a:ext cx="1276704" cy="425568"/>
+          </a:xfrm>
+          <a:prstGeom prst="rect">
+            <a:avLst/>
+          </a:prstGeom>
+        </p:spPr>
+      </p:pic>
+      <p:pic>
+        <p:nvPicPr>
+          <p:cNvPr id="43" name="Picture 42">
+            <a:extLst>
+              <a:ext uri="{FF2B5EF4-FFF2-40B4-BE49-F238E27FC236}">
+                <a16:creationId xmlns:a16="http://schemas.microsoft.com/office/drawing/2014/main" id="{8EFF60F5-8D8F-4E3D-9C1B-D4A28AE40D12}"/>
+              </a:ext>
+            </a:extLst>
+          </p:cNvPr>
+          <p:cNvPicPr>
+            <a:picLocks noChangeAspect="1"/>
+          </p:cNvPicPr>
+          <p:nvPr/>
+        </p:nvPicPr>
+        <p:blipFill>
+          <a:blip r:embed="rId7" cstate="print">
+            <a:extLst>
+              <a:ext uri="{28A0092B-C50C-407E-A947-70E740481C1C}">
+                <a14:useLocalDpi xmlns:a14="http://schemas.microsoft.com/office/drawing/2010/main" val="0"/>
+              </a:ext>
+            </a:extLst>
+          </a:blip>
+          <a:stretch>
+            <a:fillRect/>
+          </a:stretch>
+        </p:blipFill>
+        <p:spPr>
+          <a:xfrm>
+            <a:off x="4436379" y="1209875"/>
+            <a:ext cx="861085" cy="861085"/>
+          </a:xfrm>
+          <a:prstGeom prst="rect">
+            <a:avLst/>
+          </a:prstGeom>
+        </p:spPr>
+      </p:pic>
+      <p:pic>
+        <p:nvPicPr>
+          <p:cNvPr id="69" name="Picture 68">
+            <a:extLst>
+              <a:ext uri="{FF2B5EF4-FFF2-40B4-BE49-F238E27FC236}">
+                <a16:creationId xmlns:a16="http://schemas.microsoft.com/office/drawing/2014/main" id="{69D2D8E1-DDF8-49B1-8005-E64AAD066F83}"/>
+              </a:ext>
+            </a:extLst>
+          </p:cNvPr>
+          <p:cNvPicPr>
+            <a:picLocks noChangeAspect="1"/>
+          </p:cNvPicPr>
+          <p:nvPr/>
+        </p:nvPicPr>
+        <p:blipFill>
+          <a:blip r:embed="rId8">
+            <a:extLst>
+              <a:ext uri="{28A0092B-C50C-407E-A947-70E740481C1C}">
+                <a14:useLocalDpi xmlns:a14="http://schemas.microsoft.com/office/drawing/2010/main" val="0"/>
+              </a:ext>
+            </a:extLst>
+          </a:blip>
+          <a:stretch>
+            <a:fillRect/>
+          </a:stretch>
+        </p:blipFill>
+        <p:spPr>
+          <a:xfrm>
+            <a:off x="5637034" y="659422"/>
+            <a:ext cx="1721538" cy="1721538"/>
+          </a:xfrm>
+          <a:prstGeom prst="rect">
+            <a:avLst/>
+          </a:prstGeom>
+        </p:spPr>
+      </p:pic>
     </p:spTree>
     <p:extLst>
       <p:ext uri="{BB962C8B-B14F-4D97-AF65-F5344CB8AC3E}">
@@ -30034,10 +30174,6 @@
               </a:rPr>
               <a:t>by</a:t>
             </a:r>
-            <a:endParaRPr lang="en-IN" sz="2400" dirty="0">
-              <a:latin typeface="Times New Roman" pitchFamily="18" charset="0"/>
-              <a:cs typeface="Times New Roman" pitchFamily="18" charset="0"/>
-            </a:endParaRPr>
           </a:p>
           <a:p>
             <a:pPr algn="ctr"/>
@@ -35195,7 +35331,7 @@
           <p:cNvPr id="65" name="Content Placeholder 4">
             <a:extLst>
               <a:ext uri="{FF2B5EF4-FFF2-40B4-BE49-F238E27FC236}">
-                <a16:creationId xmlns:a16="http://schemas.microsoft.com/office/drawing/2014/main" xmlns="" id="{7BF9F0F9-5BC9-4CB9-99D8-5D9E77EBA532}"/>
+                <a16:creationId xmlns:a16="http://schemas.microsoft.com/office/drawing/2014/main" id="{7BF9F0F9-5BC9-4CB9-99D8-5D9E77EBA532}"/>
               </a:ext>
             </a:extLst>
           </p:cNvPr>
@@ -35355,19 +35491,15 @@
             </a:lvl9pPr>
           </a:lstStyle>
           <a:p>
-            <a:endParaRPr lang="en-US" dirty="0" smtClean="0"/>
-          </a:p>
-          <a:p>
             <a:endParaRPr lang="en-US" dirty="0"/>
           </a:p>
           <a:p>
-            <a:r>
-              <a:rPr lang="en-US" dirty="0" smtClean="0"/>
-              <a:t>Small </a:t>
-            </a:r>
+            <a:endParaRPr lang="en-US" dirty="0"/>
+          </a:p>
+          <a:p>
             <a:r>
               <a:rPr lang="en-US" dirty="0"/>
-              <a:t>size solutions of team of 5 to 10 resources:</a:t>
+              <a:t>Small size solutions of team of 5 to 10 resources:</a:t>
             </a:r>
           </a:p>
           <a:p>
@@ -35517,7 +35649,7 @@
           <p:cNvPr id="2" name="Title 1">
             <a:extLst>
               <a:ext uri="{FF2B5EF4-FFF2-40B4-BE49-F238E27FC236}">
-                <a16:creationId xmlns:a16="http://schemas.microsoft.com/office/drawing/2014/main" xmlns="" id="{FDB1AA29-50E7-47E6-B428-02DFC33376E2}"/>
+                <a16:creationId xmlns:a16="http://schemas.microsoft.com/office/drawing/2014/main" id="{FDB1AA29-50E7-47E6-B428-02DFC33376E2}"/>
               </a:ext>
             </a:extLst>
           </p:cNvPr>
@@ -35545,7 +35677,7 @@
           <p:cNvPr id="5" name="Content Placeholder 4">
             <a:extLst>
               <a:ext uri="{FF2B5EF4-FFF2-40B4-BE49-F238E27FC236}">
-                <a16:creationId xmlns:a16="http://schemas.microsoft.com/office/drawing/2014/main" xmlns="" id="{847CD382-9F7F-4E8D-9A4A-354D788A0575}"/>
+                <a16:creationId xmlns:a16="http://schemas.microsoft.com/office/drawing/2014/main" id="{847CD382-9F7F-4E8D-9A4A-354D788A0575}"/>
               </a:ext>
             </a:extLst>
           </p:cNvPr>
@@ -35580,7 +35712,7 @@
           <p:cNvPr id="6" name="Rectangle 5">
             <a:extLst>
               <a:ext uri="{FF2B5EF4-FFF2-40B4-BE49-F238E27FC236}">
-                <a16:creationId xmlns:a16="http://schemas.microsoft.com/office/drawing/2014/main" xmlns="" id="{098B67DA-9FA7-4BEF-A34E-941BB7FC651C}"/>
+                <a16:creationId xmlns:a16="http://schemas.microsoft.com/office/drawing/2014/main" id="{098B67DA-9FA7-4BEF-A34E-941BB7FC651C}"/>
               </a:ext>
             </a:extLst>
           </p:cNvPr>
@@ -35692,7 +35824,7 @@
           <p:cNvPr id="2" name="Title 1">
             <a:extLst>
               <a:ext uri="{FF2B5EF4-FFF2-40B4-BE49-F238E27FC236}">
-                <a16:creationId xmlns:a16="http://schemas.microsoft.com/office/drawing/2014/main" xmlns="" id="{C92193BD-EEB5-4CC3-BE21-D39BD95A385D}"/>
+                <a16:creationId xmlns:a16="http://schemas.microsoft.com/office/drawing/2014/main" id="{C92193BD-EEB5-4CC3-BE21-D39BD95A385D}"/>
               </a:ext>
             </a:extLst>
           </p:cNvPr>
@@ -35720,7 +35852,7 @@
           <p:cNvPr id="3" name="Content Placeholder 2">
             <a:extLst>
               <a:ext uri="{FF2B5EF4-FFF2-40B4-BE49-F238E27FC236}">
-                <a16:creationId xmlns:a16="http://schemas.microsoft.com/office/drawing/2014/main" xmlns="" id="{A4590DDC-E5B1-460D-8B70-03C4082BCC79}"/>
+                <a16:creationId xmlns:a16="http://schemas.microsoft.com/office/drawing/2014/main" id="{A4590DDC-E5B1-460D-8B70-03C4082BCC79}"/>
               </a:ext>
             </a:extLst>
           </p:cNvPr>

</xml_diff>